<commit_message>
add paper to repository, update for talk
</commit_message>
<xml_diff>
--- a/presentation/quantum_craps_slides_AMH.pptx
+++ b/presentation/quantum_craps_slides_AMH.pptx
@@ -2968,7 +2968,9 @@
   <p:cSld>
     <p:bg>
       <p:bgPr>
-        <a:pattFill prst="pct5"/>
+        <a:solidFill>
+          <a:schemeClr val="bg1"/>
+        </a:solidFill>
         <a:effectLst/>
       </p:bgPr>
     </p:bg>
@@ -3142,14 +3144,9 @@
   <p:cSld>
     <p:bg>
       <p:bgPr>
-        <a:pattFill prst="pct5">
-          <a:fgClr>
-            <a:schemeClr val="accent6"/>
-          </a:fgClr>
-          <a:bgClr>
-            <a:schemeClr val="bg1"/>
-          </a:bgClr>
-        </a:pattFill>
+        <a:solidFill>
+          <a:schemeClr val="bg1"/>
+        </a:solidFill>
         <a:effectLst/>
       </p:bgPr>
     </p:bg>
@@ -3269,14 +3266,9 @@
   <p:cSld>
     <p:bg>
       <p:bgPr>
-        <a:pattFill prst="pct5">
-          <a:fgClr>
-            <a:schemeClr val="accent6"/>
-          </a:fgClr>
-          <a:bgClr>
-            <a:schemeClr val="bg1"/>
-          </a:bgClr>
-        </a:pattFill>
+        <a:solidFill>
+          <a:schemeClr val="bg1"/>
+        </a:solidFill>
         <a:effectLst/>
       </p:bgPr>
     </p:bg>
@@ -3418,14 +3410,9 @@
   <p:cSld>
     <p:bg>
       <p:bgPr>
-        <a:pattFill prst="pct5">
-          <a:fgClr>
-            <a:schemeClr val="accent6"/>
-          </a:fgClr>
-          <a:bgClr>
-            <a:schemeClr val="bg1"/>
-          </a:bgClr>
-        </a:pattFill>
+        <a:solidFill>
+          <a:schemeClr val="bg1"/>
+        </a:solidFill>
         <a:effectLst/>
       </p:bgPr>
     </p:bg>
@@ -3566,14 +3553,9 @@
   <p:cSld>
     <p:bg>
       <p:bgPr>
-        <a:pattFill prst="pct5">
-          <a:fgClr>
-            <a:schemeClr val="accent6"/>
-          </a:fgClr>
-          <a:bgClr>
-            <a:schemeClr val="bg1"/>
-          </a:bgClr>
-        </a:pattFill>
+        <a:solidFill>
+          <a:schemeClr val="bg1"/>
+        </a:solidFill>
         <a:effectLst/>
       </p:bgPr>
     </p:bg>
@@ -3727,14 +3709,9 @@
   <p:cSld>
     <p:bg>
       <p:bgPr>
-        <a:pattFill prst="pct5">
-          <a:fgClr>
-            <a:schemeClr val="accent6"/>
-          </a:fgClr>
-          <a:bgClr>
-            <a:schemeClr val="bg1"/>
-          </a:bgClr>
-        </a:pattFill>
+        <a:solidFill>
+          <a:schemeClr val="bg1"/>
+        </a:solidFill>
         <a:effectLst/>
       </p:bgPr>
     </p:bg>
@@ -3897,14 +3874,9 @@
   <p:cSld>
     <p:bg>
       <p:bgPr>
-        <a:pattFill prst="pct5">
-          <a:fgClr>
-            <a:schemeClr val="accent6"/>
-          </a:fgClr>
-          <a:bgClr>
-            <a:schemeClr val="bg1"/>
-          </a:bgClr>
-        </a:pattFill>
+        <a:solidFill>
+          <a:schemeClr val="bg1"/>
+        </a:solidFill>
         <a:effectLst/>
       </p:bgPr>
     </p:bg>

</xml_diff>